<commit_message>
add de aplicação funcional
</commit_message>
<xml_diff>
--- a/Documentacao/Análise de sistemas/Slides KPRunnin - Sprint 2.pptx
+++ b/Documentacao/Análise de sistemas/Slides KPRunnin - Sprint 2.pptx
@@ -26,45 +26,45 @@
     <p:sldId id="291" r:id="rId17"/>
     <p:sldId id="312" r:id="rId18"/>
     <p:sldId id="292" r:id="rId19"/>
-    <p:sldId id="311" r:id="rId20"/>
+    <p:sldId id="324" r:id="rId20"/>
   </p:sldIdLst>
   <p:sldSz cx="9144000" cy="5143500" type="screen16x9"/>
   <p:notesSz cx="6858000" cy="9144000"/>
   <p:embeddedFontLst>
     <p:embeddedFont>
-      <p:font typeface="Bahnschrift" panose="020B0502040204020203" pitchFamily="34" charset="0"/>
+      <p:font typeface="Roboto Thin" panose="020B0604020202020204" charset="0"/>
       <p:regular r:id="rId22"/>
       <p:bold r:id="rId23"/>
+      <p:italic r:id="rId24"/>
+      <p:boldItalic r:id="rId25"/>
     </p:embeddedFont>
     <p:embeddedFont>
-      <p:font typeface="Gadugi" panose="020B0502040204020203" pitchFamily="34" charset="0"/>
-      <p:regular r:id="rId24"/>
-      <p:bold r:id="rId25"/>
-    </p:embeddedFont>
-    <p:embeddedFont>
-      <p:font typeface="Roboto Thin" panose="020B0604020202020204" charset="0"/>
+      <p:font typeface="Roboto Light" panose="020B0604020202020204" charset="0"/>
       <p:regular r:id="rId26"/>
       <p:bold r:id="rId27"/>
       <p:italic r:id="rId28"/>
       <p:boldItalic r:id="rId29"/>
     </p:embeddedFont>
     <p:embeddedFont>
-      <p:font typeface="Roboto Light" panose="020B0604020202020204" charset="0"/>
+      <p:font typeface="Gadugi" panose="020B0502040204020203" pitchFamily="34" charset="0"/>
       <p:regular r:id="rId30"/>
       <p:bold r:id="rId31"/>
-      <p:italic r:id="rId32"/>
-      <p:boldItalic r:id="rId33"/>
+    </p:embeddedFont>
+    <p:embeddedFont>
+      <p:font typeface="Bahnschrift" panose="020B0502040204020203" pitchFamily="34" charset="0"/>
+      <p:regular r:id="rId32"/>
+      <p:bold r:id="rId33"/>
+    </p:embeddedFont>
+    <p:embeddedFont>
+      <p:font typeface="Lucida Sans Unicode" panose="020B0602030504020204" pitchFamily="34" charset="0"/>
+      <p:regular r:id="rId34"/>
     </p:embeddedFont>
     <p:embeddedFont>
       <p:font typeface="Josefin Sans" panose="020B0604020202020204" charset="0"/>
-      <p:regular r:id="rId34"/>
-      <p:bold r:id="rId35"/>
-      <p:italic r:id="rId36"/>
-      <p:boldItalic r:id="rId37"/>
-    </p:embeddedFont>
-    <p:embeddedFont>
-      <p:font typeface="Lucida Sans Unicode" panose="020B0602030504020204" pitchFamily="34" charset="0"/>
-      <p:regular r:id="rId38"/>
+      <p:regular r:id="rId35"/>
+      <p:bold r:id="rId36"/>
+      <p:italic r:id="rId37"/>
+      <p:boldItalic r:id="rId38"/>
     </p:embeddedFont>
   </p:embeddedFontLst>
   <p:defaultTextStyle>
@@ -1939,7 +1939,7 @@
     </p:spTree>
     <p:extLst>
       <p:ext uri="{BB962C8B-B14F-4D97-AF65-F5344CB8AC3E}">
-        <p14:creationId xmlns:p14="http://schemas.microsoft.com/office/powerpoint/2010/main" val="833703569"/>
+        <p14:creationId xmlns:p14="http://schemas.microsoft.com/office/powerpoint/2010/main" val="2815089997"/>
       </p:ext>
     </p:extLst>
   </p:cSld>
@@ -15697,7 +15697,7 @@
           <p:cNvPr id="14" name="Imagem 13">
             <a:extLst>
               <a:ext uri="{FF2B5EF4-FFF2-40B4-BE49-F238E27FC236}">
-                <a16:creationId xmlns="" xmlns:a16="http://schemas.microsoft.com/office/drawing/2014/main" id="{A1546BA2-A746-4D78-BA2A-66EACE53308E}"/>
+                <a16:creationId xmlns:a16="http://schemas.microsoft.com/office/drawing/2014/main" xmlns="" id="{A1546BA2-A746-4D78-BA2A-66EACE53308E}"/>
               </a:ext>
             </a:extLst>
           </p:cNvPr>
@@ -15954,7 +15954,7 @@
           <p:cNvPr id="7" name="Imagem 6">
             <a:extLst>
               <a:ext uri="{FF2B5EF4-FFF2-40B4-BE49-F238E27FC236}">
-                <a16:creationId xmlns="" xmlns:a16="http://schemas.microsoft.com/office/drawing/2014/main" id="{A1546BA2-A746-4D78-BA2A-66EACE53308E}"/>
+                <a16:creationId xmlns:a16="http://schemas.microsoft.com/office/drawing/2014/main" xmlns="" id="{A1546BA2-A746-4D78-BA2A-66EACE53308E}"/>
               </a:ext>
             </a:extLst>
           </p:cNvPr>
@@ -16300,7 +16300,7 @@
           <p:cNvPr id="14" name="Imagem 13">
             <a:extLst>
               <a:ext uri="{FF2B5EF4-FFF2-40B4-BE49-F238E27FC236}">
-                <a16:creationId xmlns="" xmlns:a16="http://schemas.microsoft.com/office/drawing/2014/main" id="{A1546BA2-A746-4D78-BA2A-66EACE53308E}"/>
+                <a16:creationId xmlns:a16="http://schemas.microsoft.com/office/drawing/2014/main" xmlns="" id="{A1546BA2-A746-4D78-BA2A-66EACE53308E}"/>
               </a:ext>
             </a:extLst>
           </p:cNvPr>
@@ -16570,7 +16570,7 @@
           <p:cNvPr id="7" name="Imagem 6">
             <a:extLst>
               <a:ext uri="{FF2B5EF4-FFF2-40B4-BE49-F238E27FC236}">
-                <a16:creationId xmlns="" xmlns:a16="http://schemas.microsoft.com/office/drawing/2014/main" id="{A1546BA2-A746-4D78-BA2A-66EACE53308E}"/>
+                <a16:creationId xmlns:a16="http://schemas.microsoft.com/office/drawing/2014/main" xmlns="" id="{A1546BA2-A746-4D78-BA2A-66EACE53308E}"/>
               </a:ext>
             </a:extLst>
           </p:cNvPr>
@@ -16606,7 +16606,7 @@
           <p:cNvPr id="8" name="Imagem 7" descr="Uma imagem contendo relógio&#10;&#10;Descrição gerada automaticamente">
             <a:extLst>
               <a:ext uri="{FF2B5EF4-FFF2-40B4-BE49-F238E27FC236}">
-                <a16:creationId xmlns="" xmlns:a16="http://schemas.microsoft.com/office/drawing/2014/main" id="{EA954568-830E-4114-A575-5A8F5CE2BDC0}"/>
+                <a16:creationId xmlns:a16="http://schemas.microsoft.com/office/drawing/2014/main" xmlns="" id="{EA954568-830E-4114-A575-5A8F5CE2BDC0}"/>
               </a:ext>
             </a:extLst>
           </p:cNvPr>
@@ -16977,7 +16977,7 @@
           <p:cNvPr id="7" name="Imagem 6">
             <a:extLst>
               <a:ext uri="{FF2B5EF4-FFF2-40B4-BE49-F238E27FC236}">
-                <a16:creationId xmlns="" xmlns:a16="http://schemas.microsoft.com/office/drawing/2014/main" id="{A1546BA2-A746-4D78-BA2A-66EACE53308E}"/>
+                <a16:creationId xmlns:a16="http://schemas.microsoft.com/office/drawing/2014/main" xmlns="" id="{A1546BA2-A746-4D78-BA2A-66EACE53308E}"/>
               </a:ext>
             </a:extLst>
           </p:cNvPr>
@@ -17277,7 +17277,7 @@
           <p:cNvPr id="7" name="Imagem 6">
             <a:extLst>
               <a:ext uri="{FF2B5EF4-FFF2-40B4-BE49-F238E27FC236}">
-                <a16:creationId xmlns="" xmlns:a16="http://schemas.microsoft.com/office/drawing/2014/main" id="{A1546BA2-A746-4D78-BA2A-66EACE53308E}"/>
+                <a16:creationId xmlns:a16="http://schemas.microsoft.com/office/drawing/2014/main" xmlns="" id="{A1546BA2-A746-4D78-BA2A-66EACE53308E}"/>
               </a:ext>
             </a:extLst>
           </p:cNvPr>
@@ -17338,6 +17338,438 @@
           </a:prstGeom>
         </p:spPr>
       </p:pic>
+      <p:sp>
+        <p:nvSpPr>
+          <p:cNvPr id="2" name="Retângulo 1"/>
+          <p:cNvSpPr/>
+          <p:nvPr/>
+        </p:nvSpPr>
+        <p:spPr>
+          <a:xfrm>
+            <a:off x="1317171" y="3743325"/>
+            <a:ext cx="1643743" cy="262618"/>
+          </a:xfrm>
+          <a:prstGeom prst="rect">
+            <a:avLst/>
+          </a:prstGeom>
+          <a:solidFill>
+            <a:srgbClr val="7F7F7F"/>
+          </a:solidFill>
+          <a:ln>
+            <a:solidFill>
+              <a:srgbClr val="7F7F7F"/>
+            </a:solidFill>
+          </a:ln>
+        </p:spPr>
+        <p:style>
+          <a:lnRef idx="2">
+            <a:schemeClr val="accent1">
+              <a:shade val="50000"/>
+            </a:schemeClr>
+          </a:lnRef>
+          <a:fillRef idx="1">
+            <a:schemeClr val="accent1"/>
+          </a:fillRef>
+          <a:effectRef idx="0">
+            <a:schemeClr val="accent1"/>
+          </a:effectRef>
+          <a:fontRef idx="minor">
+            <a:schemeClr val="lt1"/>
+          </a:fontRef>
+        </p:style>
+        <p:txBody>
+          <a:bodyPr rtlCol="0" anchor="ctr"/>
+          <a:lstStyle/>
+          <a:p>
+            <a:pPr algn="ctr"/>
+            <a:endParaRPr lang="pt-BR"/>
+          </a:p>
+        </p:txBody>
+      </p:sp>
+      <p:sp>
+        <p:nvSpPr>
+          <p:cNvPr id="4" name="Retângulo 3"/>
+          <p:cNvSpPr/>
+          <p:nvPr/>
+        </p:nvSpPr>
+        <p:spPr>
+          <a:xfrm>
+            <a:off x="3429000" y="3820659"/>
+            <a:ext cx="98425" cy="138566"/>
+          </a:xfrm>
+          <a:prstGeom prst="rect">
+            <a:avLst/>
+          </a:prstGeom>
+          <a:solidFill>
+            <a:srgbClr val="A6A6A6"/>
+          </a:solidFill>
+          <a:ln>
+            <a:solidFill>
+              <a:srgbClr val="A6A6A6"/>
+            </a:solidFill>
+          </a:ln>
+        </p:spPr>
+        <p:style>
+          <a:lnRef idx="2">
+            <a:schemeClr val="accent1">
+              <a:shade val="50000"/>
+            </a:schemeClr>
+          </a:lnRef>
+          <a:fillRef idx="1">
+            <a:schemeClr val="accent1"/>
+          </a:fillRef>
+          <a:effectRef idx="0">
+            <a:schemeClr val="accent1"/>
+          </a:effectRef>
+          <a:fontRef idx="minor">
+            <a:schemeClr val="lt1"/>
+          </a:fontRef>
+        </p:style>
+        <p:txBody>
+          <a:bodyPr rtlCol="0" anchor="ctr"/>
+          <a:lstStyle/>
+          <a:p>
+            <a:pPr algn="ctr"/>
+            <a:endParaRPr lang="pt-BR"/>
+          </a:p>
+        </p:txBody>
+      </p:sp>
+      <p:sp>
+        <p:nvSpPr>
+          <p:cNvPr id="9" name="Retângulo 8"/>
+          <p:cNvSpPr/>
+          <p:nvPr/>
+        </p:nvSpPr>
+        <p:spPr>
+          <a:xfrm>
+            <a:off x="3492500" y="3646232"/>
+            <a:ext cx="561975" cy="45719"/>
+          </a:xfrm>
+          <a:prstGeom prst="rect">
+            <a:avLst/>
+          </a:prstGeom>
+          <a:solidFill>
+            <a:srgbClr val="A6A6A6"/>
+          </a:solidFill>
+          <a:ln>
+            <a:solidFill>
+              <a:srgbClr val="A6A6A6"/>
+            </a:solidFill>
+          </a:ln>
+        </p:spPr>
+        <p:style>
+          <a:lnRef idx="2">
+            <a:schemeClr val="accent1">
+              <a:shade val="50000"/>
+            </a:schemeClr>
+          </a:lnRef>
+          <a:fillRef idx="1">
+            <a:schemeClr val="accent1"/>
+          </a:fillRef>
+          <a:effectRef idx="0">
+            <a:schemeClr val="accent1"/>
+          </a:effectRef>
+          <a:fontRef idx="minor">
+            <a:schemeClr val="lt1"/>
+          </a:fontRef>
+        </p:style>
+        <p:txBody>
+          <a:bodyPr rtlCol="0" anchor="ctr"/>
+          <a:lstStyle/>
+          <a:p>
+            <a:pPr algn="ctr"/>
+            <a:endParaRPr lang="pt-BR"/>
+          </a:p>
+        </p:txBody>
+      </p:sp>
+      <p:sp>
+        <p:nvSpPr>
+          <p:cNvPr id="11" name="Retângulo 10"/>
+          <p:cNvSpPr/>
+          <p:nvPr/>
+        </p:nvSpPr>
+        <p:spPr>
+          <a:xfrm>
+            <a:off x="6924675" y="2572884"/>
+            <a:ext cx="98425" cy="138566"/>
+          </a:xfrm>
+          <a:prstGeom prst="rect">
+            <a:avLst/>
+          </a:prstGeom>
+          <a:solidFill>
+            <a:srgbClr val="A6A6A6"/>
+          </a:solidFill>
+          <a:ln>
+            <a:solidFill>
+              <a:srgbClr val="A6A6A6"/>
+            </a:solidFill>
+          </a:ln>
+        </p:spPr>
+        <p:style>
+          <a:lnRef idx="2">
+            <a:schemeClr val="accent1">
+              <a:shade val="50000"/>
+            </a:schemeClr>
+          </a:lnRef>
+          <a:fillRef idx="1">
+            <a:schemeClr val="accent1"/>
+          </a:fillRef>
+          <a:effectRef idx="0">
+            <a:schemeClr val="accent1"/>
+          </a:effectRef>
+          <a:fontRef idx="minor">
+            <a:schemeClr val="lt1"/>
+          </a:fontRef>
+        </p:style>
+        <p:txBody>
+          <a:bodyPr rtlCol="0" anchor="ctr"/>
+          <a:lstStyle/>
+          <a:p>
+            <a:pPr algn="ctr"/>
+            <a:endParaRPr lang="pt-BR"/>
+          </a:p>
+        </p:txBody>
+      </p:sp>
+      <p:sp>
+        <p:nvSpPr>
+          <p:cNvPr id="12" name="Retângulo 11"/>
+          <p:cNvSpPr/>
+          <p:nvPr/>
+        </p:nvSpPr>
+        <p:spPr>
+          <a:xfrm>
+            <a:off x="1498600" y="4102498"/>
+            <a:ext cx="98425" cy="138566"/>
+          </a:xfrm>
+          <a:prstGeom prst="rect">
+            <a:avLst/>
+          </a:prstGeom>
+          <a:solidFill>
+            <a:srgbClr val="A6A6A6"/>
+          </a:solidFill>
+          <a:ln>
+            <a:solidFill>
+              <a:srgbClr val="A6A6A6"/>
+            </a:solidFill>
+          </a:ln>
+        </p:spPr>
+        <p:style>
+          <a:lnRef idx="2">
+            <a:schemeClr val="accent1">
+              <a:shade val="50000"/>
+            </a:schemeClr>
+          </a:lnRef>
+          <a:fillRef idx="1">
+            <a:schemeClr val="accent1"/>
+          </a:fillRef>
+          <a:effectRef idx="0">
+            <a:schemeClr val="accent1"/>
+          </a:effectRef>
+          <a:fontRef idx="minor">
+            <a:schemeClr val="lt1"/>
+          </a:fontRef>
+        </p:style>
+        <p:txBody>
+          <a:bodyPr rtlCol="0" anchor="ctr"/>
+          <a:lstStyle/>
+          <a:p>
+            <a:pPr algn="ctr"/>
+            <a:endParaRPr lang="pt-BR"/>
+          </a:p>
+        </p:txBody>
+      </p:sp>
+      <p:sp>
+        <p:nvSpPr>
+          <p:cNvPr id="13" name="Retângulo 12"/>
+          <p:cNvSpPr/>
+          <p:nvPr/>
+        </p:nvSpPr>
+        <p:spPr>
+          <a:xfrm>
+            <a:off x="5811157" y="1839204"/>
+            <a:ext cx="561975" cy="45719"/>
+          </a:xfrm>
+          <a:prstGeom prst="rect">
+            <a:avLst/>
+          </a:prstGeom>
+          <a:solidFill>
+            <a:srgbClr val="7F7F7F"/>
+          </a:solidFill>
+          <a:ln>
+            <a:solidFill>
+              <a:srgbClr val="7F7F7F"/>
+            </a:solidFill>
+          </a:ln>
+        </p:spPr>
+        <p:style>
+          <a:lnRef idx="2">
+            <a:schemeClr val="accent1">
+              <a:shade val="50000"/>
+            </a:schemeClr>
+          </a:lnRef>
+          <a:fillRef idx="1">
+            <a:schemeClr val="accent1"/>
+          </a:fillRef>
+          <a:effectRef idx="0">
+            <a:schemeClr val="accent1"/>
+          </a:effectRef>
+          <a:fontRef idx="minor">
+            <a:schemeClr val="lt1"/>
+          </a:fontRef>
+        </p:style>
+        <p:txBody>
+          <a:bodyPr rtlCol="0" anchor="ctr"/>
+          <a:lstStyle/>
+          <a:p>
+            <a:pPr algn="ctr"/>
+            <a:endParaRPr lang="pt-BR"/>
+          </a:p>
+        </p:txBody>
+      </p:sp>
+      <p:sp>
+        <p:nvSpPr>
+          <p:cNvPr id="14" name="Retângulo 13"/>
+          <p:cNvSpPr/>
+          <p:nvPr/>
+        </p:nvSpPr>
+        <p:spPr>
+          <a:xfrm>
+            <a:off x="7471341" y="1538599"/>
+            <a:ext cx="561975" cy="45719"/>
+          </a:xfrm>
+          <a:prstGeom prst="rect">
+            <a:avLst/>
+          </a:prstGeom>
+          <a:solidFill>
+            <a:srgbClr val="7F7F7F"/>
+          </a:solidFill>
+          <a:ln>
+            <a:solidFill>
+              <a:srgbClr val="7F7F7F"/>
+            </a:solidFill>
+          </a:ln>
+        </p:spPr>
+        <p:style>
+          <a:lnRef idx="2">
+            <a:schemeClr val="accent1">
+              <a:shade val="50000"/>
+            </a:schemeClr>
+          </a:lnRef>
+          <a:fillRef idx="1">
+            <a:schemeClr val="accent1"/>
+          </a:fillRef>
+          <a:effectRef idx="0">
+            <a:schemeClr val="accent1"/>
+          </a:effectRef>
+          <a:fontRef idx="minor">
+            <a:schemeClr val="lt1"/>
+          </a:fontRef>
+        </p:style>
+        <p:txBody>
+          <a:bodyPr rtlCol="0" anchor="ctr"/>
+          <a:lstStyle/>
+          <a:p>
+            <a:pPr algn="ctr"/>
+            <a:endParaRPr lang="pt-BR"/>
+          </a:p>
+        </p:txBody>
+      </p:sp>
+      <p:sp>
+        <p:nvSpPr>
+          <p:cNvPr id="15" name="Retângulo 14"/>
+          <p:cNvSpPr/>
+          <p:nvPr/>
+        </p:nvSpPr>
+        <p:spPr>
+          <a:xfrm>
+            <a:off x="6692899" y="1538599"/>
+            <a:ext cx="701676" cy="45719"/>
+          </a:xfrm>
+          <a:prstGeom prst="rect">
+            <a:avLst/>
+          </a:prstGeom>
+          <a:solidFill>
+            <a:srgbClr val="7F7F7F"/>
+          </a:solidFill>
+          <a:ln>
+            <a:solidFill>
+              <a:srgbClr val="7F7F7F"/>
+            </a:solidFill>
+          </a:ln>
+        </p:spPr>
+        <p:style>
+          <a:lnRef idx="2">
+            <a:schemeClr val="accent1">
+              <a:shade val="50000"/>
+            </a:schemeClr>
+          </a:lnRef>
+          <a:fillRef idx="1">
+            <a:schemeClr val="accent1"/>
+          </a:fillRef>
+          <a:effectRef idx="0">
+            <a:schemeClr val="accent1"/>
+          </a:effectRef>
+          <a:fontRef idx="minor">
+            <a:schemeClr val="lt1"/>
+          </a:fontRef>
+        </p:style>
+        <p:txBody>
+          <a:bodyPr rtlCol="0" anchor="ctr"/>
+          <a:lstStyle/>
+          <a:p>
+            <a:pPr algn="ctr"/>
+            <a:endParaRPr lang="pt-BR"/>
+          </a:p>
+        </p:txBody>
+      </p:sp>
+      <p:sp>
+        <p:nvSpPr>
+          <p:cNvPr id="16" name="Retângulo 15"/>
+          <p:cNvSpPr/>
+          <p:nvPr/>
+        </p:nvSpPr>
+        <p:spPr>
+          <a:xfrm>
+            <a:off x="5460318" y="3948390"/>
+            <a:ext cx="743631" cy="45719"/>
+          </a:xfrm>
+          <a:prstGeom prst="rect">
+            <a:avLst/>
+          </a:prstGeom>
+          <a:solidFill>
+            <a:srgbClr val="7F7F7F"/>
+          </a:solidFill>
+          <a:ln>
+            <a:solidFill>
+              <a:srgbClr val="7F7F7F"/>
+            </a:solidFill>
+          </a:ln>
+        </p:spPr>
+        <p:style>
+          <a:lnRef idx="2">
+            <a:schemeClr val="accent1">
+              <a:shade val="50000"/>
+            </a:schemeClr>
+          </a:lnRef>
+          <a:fillRef idx="1">
+            <a:schemeClr val="accent1"/>
+          </a:fillRef>
+          <a:effectRef idx="0">
+            <a:schemeClr val="accent1"/>
+          </a:effectRef>
+          <a:fontRef idx="minor">
+            <a:schemeClr val="lt1"/>
+          </a:fontRef>
+        </p:style>
+        <p:txBody>
+          <a:bodyPr rtlCol="0" anchor="ctr"/>
+          <a:lstStyle/>
+          <a:p>
+            <a:pPr algn="ctr"/>
+            <a:endParaRPr lang="pt-BR"/>
+          </a:p>
+        </p:txBody>
+      </p:sp>
     </p:spTree>
     <p:extLst>
       <p:ext uri="{BB962C8B-B14F-4D97-AF65-F5344CB8AC3E}">
@@ -17611,7 +18043,7 @@
           <p:cNvPr id="14" name="Imagem 13">
             <a:extLst>
               <a:ext uri="{FF2B5EF4-FFF2-40B4-BE49-F238E27FC236}">
-                <a16:creationId xmlns="" xmlns:a16="http://schemas.microsoft.com/office/drawing/2014/main" id="{A1546BA2-A746-4D78-BA2A-66EACE53308E}"/>
+                <a16:creationId xmlns:a16="http://schemas.microsoft.com/office/drawing/2014/main" xmlns="" id="{A1546BA2-A746-4D78-BA2A-66EACE53308E}"/>
               </a:ext>
             </a:extLst>
           </p:cNvPr>
@@ -17920,7 +18352,7 @@
           <p:cNvPr id="14" name="Imagem 13">
             <a:extLst>
               <a:ext uri="{FF2B5EF4-FFF2-40B4-BE49-F238E27FC236}">
-                <a16:creationId xmlns="" xmlns:a16="http://schemas.microsoft.com/office/drawing/2014/main" id="{A1546BA2-A746-4D78-BA2A-66EACE53308E}"/>
+                <a16:creationId xmlns:a16="http://schemas.microsoft.com/office/drawing/2014/main" xmlns="" id="{A1546BA2-A746-4D78-BA2A-66EACE53308E}"/>
               </a:ext>
             </a:extLst>
           </p:cNvPr>
@@ -18218,7 +18650,7 @@
           <p:cNvPr id="14" name="Imagem 13">
             <a:extLst>
               <a:ext uri="{FF2B5EF4-FFF2-40B4-BE49-F238E27FC236}">
-                <a16:creationId xmlns="" xmlns:a16="http://schemas.microsoft.com/office/drawing/2014/main" id="{A1546BA2-A746-4D78-BA2A-66EACE53308E}"/>
+                <a16:creationId xmlns:a16="http://schemas.microsoft.com/office/drawing/2014/main" xmlns="" id="{A1546BA2-A746-4D78-BA2A-66EACE53308E}"/>
               </a:ext>
             </a:extLst>
           </p:cNvPr>
@@ -18534,7 +18966,7 @@
           <p:cNvPr id="14" name="Imagem 13">
             <a:extLst>
               <a:ext uri="{FF2B5EF4-FFF2-40B4-BE49-F238E27FC236}">
-                <a16:creationId xmlns="" xmlns:a16="http://schemas.microsoft.com/office/drawing/2014/main" id="{A1546BA2-A746-4D78-BA2A-66EACE53308E}"/>
+                <a16:creationId xmlns:a16="http://schemas.microsoft.com/office/drawing/2014/main" xmlns="" id="{A1546BA2-A746-4D78-BA2A-66EACE53308E}"/>
               </a:ext>
             </a:extLst>
           </p:cNvPr>
@@ -18833,7 +19265,7 @@
           <p:cNvPr id="14" name="Imagem 13">
             <a:extLst>
               <a:ext uri="{FF2B5EF4-FFF2-40B4-BE49-F238E27FC236}">
-                <a16:creationId xmlns="" xmlns:a16="http://schemas.microsoft.com/office/drawing/2014/main" id="{A1546BA2-A746-4D78-BA2A-66EACE53308E}"/>
+                <a16:creationId xmlns:a16="http://schemas.microsoft.com/office/drawing/2014/main" xmlns="" id="{A1546BA2-A746-4D78-BA2A-66EACE53308E}"/>
               </a:ext>
             </a:extLst>
           </p:cNvPr>
@@ -18867,20 +19299,20 @@
     </p:spTree>
     <p:extLst>
       <p:ext uri="{BB962C8B-B14F-4D97-AF65-F5344CB8AC3E}">
-        <p14:creationId xmlns:p14="http://schemas.microsoft.com/office/powerpoint/2010/main" val="2862206857"/>
+        <p14:creationId xmlns:p14="http://schemas.microsoft.com/office/powerpoint/2010/main" val="2005515087"/>
       </p:ext>
     </p:extLst>
   </p:cSld>
   <p:clrMapOvr>
     <a:masterClrMapping/>
   </p:clrMapOvr>
-  <mc:AlternateContent xmlns:mc="http://schemas.openxmlformats.org/markup-compatibility/2006" xmlns:p14="http://schemas.microsoft.com/office/powerpoint/2010/main">
-    <mc:Choice Requires="p14">
+  <mc:AlternateContent xmlns:mc="http://schemas.openxmlformats.org/markup-compatibility/2006">
+    <mc:Choice xmlns:p14="http://schemas.microsoft.com/office/powerpoint/2010/main" Requires="p14">
       <p:transition spd="med" p14:dur="700">
         <p:fade/>
       </p:transition>
     </mc:Choice>
-    <mc:Fallback xmlns="">
+    <mc:Fallback>
       <p:transition spd="med">
         <p:fade/>
       </p:transition>
@@ -19229,7 +19661,7 @@
           <p:cNvPr id="22" name="Imagem 21">
             <a:extLst>
               <a:ext uri="{FF2B5EF4-FFF2-40B4-BE49-F238E27FC236}">
-                <a16:creationId xmlns="" xmlns:a16="http://schemas.microsoft.com/office/drawing/2014/main" id="{A1546BA2-A746-4D78-BA2A-66EACE53308E}"/>
+                <a16:creationId xmlns:a16="http://schemas.microsoft.com/office/drawing/2014/main" xmlns="" id="{A1546BA2-A746-4D78-BA2A-66EACE53308E}"/>
               </a:ext>
             </a:extLst>
           </p:cNvPr>
@@ -20270,7 +20702,7 @@
           <p:cNvPr id="23" name="Imagem 22">
             <a:extLst>
               <a:ext uri="{FF2B5EF4-FFF2-40B4-BE49-F238E27FC236}">
-                <a16:creationId xmlns="" xmlns:a16="http://schemas.microsoft.com/office/drawing/2014/main" id="{A1546BA2-A746-4D78-BA2A-66EACE53308E}"/>
+                <a16:creationId xmlns:a16="http://schemas.microsoft.com/office/drawing/2014/main" xmlns="" id="{A1546BA2-A746-4D78-BA2A-66EACE53308E}"/>
               </a:ext>
             </a:extLst>
           </p:cNvPr>
@@ -20491,7 +20923,7 @@
           <p:cNvPr id="12" name="Imagem 11">
             <a:extLst>
               <a:ext uri="{FF2B5EF4-FFF2-40B4-BE49-F238E27FC236}">
-                <a16:creationId xmlns="" xmlns:a16="http://schemas.microsoft.com/office/drawing/2014/main" id="{A1546BA2-A746-4D78-BA2A-66EACE53308E}"/>
+                <a16:creationId xmlns:a16="http://schemas.microsoft.com/office/drawing/2014/main" xmlns="" id="{A1546BA2-A746-4D78-BA2A-66EACE53308E}"/>
               </a:ext>
             </a:extLst>
           </p:cNvPr>
@@ -20779,7 +21211,7 @@
           <p:cNvPr id="12" name="Imagem 11">
             <a:extLst>
               <a:ext uri="{FF2B5EF4-FFF2-40B4-BE49-F238E27FC236}">
-                <a16:creationId xmlns="" xmlns:a16="http://schemas.microsoft.com/office/drawing/2014/main" id="{A1546BA2-A746-4D78-BA2A-66EACE53308E}"/>
+                <a16:creationId xmlns:a16="http://schemas.microsoft.com/office/drawing/2014/main" xmlns="" id="{A1546BA2-A746-4D78-BA2A-66EACE53308E}"/>
               </a:ext>
             </a:extLst>
           </p:cNvPr>
@@ -21095,7 +21527,7 @@
           <p:cNvPr id="14" name="Imagem 13">
             <a:extLst>
               <a:ext uri="{FF2B5EF4-FFF2-40B4-BE49-F238E27FC236}">
-                <a16:creationId xmlns="" xmlns:a16="http://schemas.microsoft.com/office/drawing/2014/main" id="{A1546BA2-A746-4D78-BA2A-66EACE53308E}"/>
+                <a16:creationId xmlns:a16="http://schemas.microsoft.com/office/drawing/2014/main" xmlns="" id="{A1546BA2-A746-4D78-BA2A-66EACE53308E}"/>
               </a:ext>
             </a:extLst>
           </p:cNvPr>
@@ -21411,7 +21843,7 @@
           <p:cNvPr id="14" name="Imagem 13">
             <a:extLst>
               <a:ext uri="{FF2B5EF4-FFF2-40B4-BE49-F238E27FC236}">
-                <a16:creationId xmlns="" xmlns:a16="http://schemas.microsoft.com/office/drawing/2014/main" id="{A1546BA2-A746-4D78-BA2A-66EACE53308E}"/>
+                <a16:creationId xmlns:a16="http://schemas.microsoft.com/office/drawing/2014/main" xmlns="" id="{A1546BA2-A746-4D78-BA2A-66EACE53308E}"/>
               </a:ext>
             </a:extLst>
           </p:cNvPr>
@@ -21699,7 +22131,7 @@
           <p:cNvPr id="14" name="Imagem 13">
             <a:extLst>
               <a:ext uri="{FF2B5EF4-FFF2-40B4-BE49-F238E27FC236}">
-                <a16:creationId xmlns="" xmlns:a16="http://schemas.microsoft.com/office/drawing/2014/main" id="{A1546BA2-A746-4D78-BA2A-66EACE53308E}"/>
+                <a16:creationId xmlns:a16="http://schemas.microsoft.com/office/drawing/2014/main" xmlns="" id="{A1546BA2-A746-4D78-BA2A-66EACE53308E}"/>
               </a:ext>
             </a:extLst>
           </p:cNvPr>
@@ -21961,7 +22393,7 @@
           <p:cNvPr id="7" name="Imagem 6">
             <a:extLst>
               <a:ext uri="{FF2B5EF4-FFF2-40B4-BE49-F238E27FC236}">
-                <a16:creationId xmlns="" xmlns:a16="http://schemas.microsoft.com/office/drawing/2014/main" id="{A1546BA2-A746-4D78-BA2A-66EACE53308E}"/>
+                <a16:creationId xmlns:a16="http://schemas.microsoft.com/office/drawing/2014/main" xmlns="" id="{A1546BA2-A746-4D78-BA2A-66EACE53308E}"/>
               </a:ext>
             </a:extLst>
           </p:cNvPr>

</xml_diff>